<commit_message>
updated with inclass changes
</commit_message>
<xml_diff>
--- a/slides/On-Campus/12_01_ReviewSession_CS163.pptx
+++ b/slides/On-Campus/12_01_ReviewSession_CS163.pptx
@@ -5,10 +5,10 @@
     <p:sldMasterId id="2147483648" r:id="rId4"/>
   </p:sldMasterIdLst>
   <p:notesMasterIdLst>
-    <p:notesMasterId r:id="rId16"/>
+    <p:notesMasterId r:id="rId17"/>
   </p:notesMasterIdLst>
   <p:handoutMasterIdLst>
-    <p:handoutMasterId r:id="rId17"/>
+    <p:handoutMasterId r:id="rId18"/>
   </p:handoutMasterIdLst>
   <p:sldIdLst>
     <p:sldId id="256" r:id="rId5"/>
@@ -19,9 +19,10 @@
     <p:sldId id="290" r:id="rId10"/>
     <p:sldId id="291" r:id="rId11"/>
     <p:sldId id="287" r:id="rId12"/>
-    <p:sldId id="292" r:id="rId13"/>
-    <p:sldId id="282" r:id="rId14"/>
-    <p:sldId id="285" r:id="rId15"/>
+    <p:sldId id="293" r:id="rId13"/>
+    <p:sldId id="292" r:id="rId14"/>
+    <p:sldId id="282" r:id="rId15"/>
+    <p:sldId id="285" r:id="rId16"/>
   </p:sldIdLst>
   <p:sldSz cx="13817600" cy="7772400"/>
   <p:notesSz cx="6858000" cy="9144000"/>
@@ -685,7 +686,7 @@
           <a:p>
             <a:fld id="{4D7E51A5-B478-1E40-8CBB-0DAA8831E99D}" type="datetimeFigureOut">
               <a:rPr lang="en-US" smtClean="0"/>
-              <a:t>11/7/2021</a:t>
+              <a:t>11/8/21</a:t>
             </a:fld>
             <a:endParaRPr lang="en-US"/>
           </a:p>
@@ -906,7 +907,7 @@
           <a:p>
             <a:fld id="{D0ED587F-861E-6740-9643-E3DDAE89B8D6}" type="datetimeFigureOut">
               <a:rPr lang="en-US" smtClean="0"/>
-              <a:t>11/7/2021</a:t>
+              <a:t>11/8/21</a:t>
             </a:fld>
             <a:endParaRPr lang="en-US"/>
           </a:p>
@@ -7862,6 +7863,112 @@
           <p:cNvPr id="2" name="Title 1">
             <a:extLst>
               <a:ext uri="{FF2B5EF4-FFF2-40B4-BE49-F238E27FC236}">
+                <a16:creationId xmlns:a16="http://schemas.microsoft.com/office/drawing/2014/main" id="{73FC01E1-2F4E-4537-986E-0DE7C2D4C52C}"/>
+              </a:ext>
+            </a:extLst>
+          </p:cNvPr>
+          <p:cNvSpPr>
+            <a:spLocks noGrp="1"/>
+          </p:cNvSpPr>
+          <p:nvPr>
+            <p:ph type="title"/>
+          </p:nvPr>
+        </p:nvSpPr>
+        <p:spPr/>
+        <p:txBody>
+          <a:bodyPr/>
+          <a:lstStyle/>
+          <a:p>
+            <a:r>
+              <a:rPr lang="en-US" dirty="0"/>
+              <a:t>Break Time</a:t>
+            </a:r>
+          </a:p>
+        </p:txBody>
+      </p:sp>
+      <p:sp>
+        <p:nvSpPr>
+          <p:cNvPr id="3" name="Text Placeholder 2">
+            <a:extLst>
+              <a:ext uri="{FF2B5EF4-FFF2-40B4-BE49-F238E27FC236}">
+                <a16:creationId xmlns:a16="http://schemas.microsoft.com/office/drawing/2014/main" id="{9456CD0B-02D4-45ED-8555-2ACFF776C0AB}"/>
+              </a:ext>
+            </a:extLst>
+          </p:cNvPr>
+          <p:cNvSpPr>
+            <a:spLocks noGrp="1"/>
+          </p:cNvSpPr>
+          <p:nvPr>
+            <p:ph type="body" idx="1"/>
+          </p:nvPr>
+        </p:nvSpPr>
+        <p:spPr/>
+        <p:txBody>
+          <a:bodyPr/>
+          <a:lstStyle/>
+          <a:p>
+            <a:r>
+              <a:rPr lang="en-US" dirty="0"/>
+              <a:t>Write a method / class / code at your table – include various things you know</a:t>
+            </a:r>
+          </a:p>
+          <a:p>
+            <a:r>
+              <a:rPr lang="en-US" dirty="0"/>
+              <a:t>Let someone else EXPLAIN what the output of your method will be</a:t>
+            </a:r>
+          </a:p>
+          <a:p>
+            <a:r>
+              <a:rPr lang="en-US" dirty="0"/>
+              <a:t>Then explain to them what you were going for, so </a:t>
+            </a:r>
+            <a:r>
+              <a:rPr lang="en-US"/>
+              <a:t>the answer</a:t>
+            </a:r>
+            <a:endParaRPr lang="en-US" dirty="0"/>
+          </a:p>
+        </p:txBody>
+      </p:sp>
+    </p:spTree>
+    <p:extLst>
+      <p:ext uri="{BB962C8B-B14F-4D97-AF65-F5344CB8AC3E}">
+        <p14:creationId xmlns:p14="http://schemas.microsoft.com/office/powerpoint/2010/main" val="1441112270"/>
+      </p:ext>
+    </p:extLst>
+  </p:cSld>
+  <p:clrMapOvr>
+    <a:masterClrMapping/>
+  </p:clrMapOvr>
+  <p:transition>
+    <p:fade/>
+  </p:transition>
+</p:sld>
+</file>
+
+<file path=ppt/slides/slide11.xml><?xml version="1.0" encoding="utf-8"?>
+<p:sld xmlns:a="http://schemas.openxmlformats.org/drawingml/2006/main" xmlns:r="http://schemas.openxmlformats.org/officeDocument/2006/relationships" xmlns:p="http://schemas.openxmlformats.org/presentationml/2006/main">
+  <p:cSld>
+    <p:spTree>
+      <p:nvGrpSpPr>
+        <p:cNvPr id="1" name=""/>
+        <p:cNvGrpSpPr/>
+        <p:nvPr/>
+      </p:nvGrpSpPr>
+      <p:grpSpPr>
+        <a:xfrm>
+          <a:off x="0" y="0"/>
+          <a:ext cx="0" cy="0"/>
+          <a:chOff x="0" y="0"/>
+          <a:chExt cx="0" cy="0"/>
+        </a:xfrm>
+      </p:grpSpPr>
+      <p:sp>
+        <p:nvSpPr>
+          <p:cNvPr id="2" name="Title 1">
+            <a:extLst>
+              <a:ext uri="{FF2B5EF4-FFF2-40B4-BE49-F238E27FC236}">
                 <a16:creationId xmlns:a16="http://schemas.microsoft.com/office/drawing/2014/main" id="{380B640B-36BF-3C4B-916C-AC584F6601AF}"/>
               </a:ext>
             </a:extLst>
@@ -10105,7 +10212,7 @@
 </p:sld>
 </file>
 
-<file path=ppt/slides/slide11.xml><?xml version="1.0" encoding="utf-8"?>
+<file path=ppt/slides/slide12.xml><?xml version="1.0" encoding="utf-8"?>
 <p:sld xmlns:a="http://schemas.openxmlformats.org/drawingml/2006/main" xmlns:r="http://schemas.openxmlformats.org/officeDocument/2006/relationships" xmlns:p="http://schemas.openxmlformats.org/presentationml/2006/main">
   <p:cSld>
     <p:spTree>
@@ -15136,8 +15243,8 @@
           </a:p>
         </p:txBody>
       </p:sp>
-      <mc:AlternateContent xmlns:mc="http://schemas.openxmlformats.org/markup-compatibility/2006">
-        <mc:Choice xmlns:p14="http://schemas.microsoft.com/office/powerpoint/2010/main" Requires="p14">
+      <mc:AlternateContent xmlns:mc="http://schemas.openxmlformats.org/markup-compatibility/2006" xmlns:p14="http://schemas.microsoft.com/office/powerpoint/2010/main">
+        <mc:Choice Requires="p14">
           <p:contentPart p14:bwMode="auto" r:id="rId2">
             <p14:nvContentPartPr>
               <p14:cNvPr id="68" name="Ink 67">
@@ -15156,7 +15263,7 @@
             </p14:xfrm>
           </p:contentPart>
         </mc:Choice>
-        <mc:Fallback>
+        <mc:Fallback xmlns="">
           <p:pic>
             <p:nvPicPr>
               <p:cNvPr id="68" name="Ink 67">
@@ -15187,8 +15294,8 @@
           </p:pic>
         </mc:Fallback>
       </mc:AlternateContent>
-      <mc:AlternateContent xmlns:mc="http://schemas.openxmlformats.org/markup-compatibility/2006">
-        <mc:Choice xmlns:p14="http://schemas.microsoft.com/office/powerpoint/2010/main" Requires="p14">
+      <mc:AlternateContent xmlns:mc="http://schemas.openxmlformats.org/markup-compatibility/2006" xmlns:p14="http://schemas.microsoft.com/office/powerpoint/2010/main">
+        <mc:Choice Requires="p14">
           <p:contentPart p14:bwMode="auto" r:id="rId4">
             <p14:nvContentPartPr>
               <p14:cNvPr id="69" name="Ink 68">
@@ -15207,7 +15314,7 @@
             </p14:xfrm>
           </p:contentPart>
         </mc:Choice>
-        <mc:Fallback>
+        <mc:Fallback xmlns="">
           <p:pic>
             <p:nvPicPr>
               <p:cNvPr id="69" name="Ink 68">
@@ -23893,7 +24000,7 @@
           <p:cNvPr id="2" name="Title 1">
             <a:extLst>
               <a:ext uri="{FF2B5EF4-FFF2-40B4-BE49-F238E27FC236}">
-                <a16:creationId xmlns:a16="http://schemas.microsoft.com/office/drawing/2014/main" id="{73FC01E1-2F4E-4537-986E-0DE7C2D4C52C}"/>
+                <a16:creationId xmlns:a16="http://schemas.microsoft.com/office/drawing/2014/main" id="{D2B6DFF6-9609-4444-BB57-9B46784A23C9}"/>
               </a:ext>
             </a:extLst>
           </p:cNvPr>
@@ -23911,7 +24018,7 @@
           <a:p>
             <a:r>
               <a:rPr lang="en-US" dirty="0"/>
-              <a:t>Break Time</a:t>
+              <a:t>Class / Objects</a:t>
             </a:r>
           </a:p>
         </p:txBody>
@@ -23921,7 +24028,7 @@
           <p:cNvPr id="3" name="Text Placeholder 2">
             <a:extLst>
               <a:ext uri="{FF2B5EF4-FFF2-40B4-BE49-F238E27FC236}">
-                <a16:creationId xmlns:a16="http://schemas.microsoft.com/office/drawing/2014/main" id="{9456CD0B-02D4-45ED-8555-2ACFF776C0AB}"/>
+                <a16:creationId xmlns:a16="http://schemas.microsoft.com/office/drawing/2014/main" id="{7D51C03B-D586-9348-BB8D-7083DDC60B04}"/>
               </a:ext>
             </a:extLst>
           </p:cNvPr>
@@ -23932,31 +24039,58 @@
             <p:ph type="body" idx="1"/>
           </p:nvPr>
         </p:nvSpPr>
-        <p:spPr/>
+        <p:spPr>
+          <a:xfrm>
+            <a:off x="628075" y="2487882"/>
+            <a:ext cx="12561413" cy="3991939"/>
+          </a:xfrm>
+        </p:spPr>
         <p:txBody>
           <a:bodyPr/>
           <a:lstStyle/>
           <a:p>
             <a:r>
               <a:rPr lang="en-US" dirty="0"/>
-              <a:t>Write a method / class / code at your table – include various things you know</a:t>
-            </a:r>
+              <a:t>Discussion – What is a class / object?</a:t>
+            </a:r>
+          </a:p>
+          <a:p>
+            <a:endParaRPr lang="en-US" dirty="0"/>
           </a:p>
           <a:p>
             <a:r>
               <a:rPr lang="en-US" dirty="0"/>
-              <a:t>Let someone else EXPLAIN what the output of your method will be</a:t>
+              <a:t>A block of code – that is reusable</a:t>
             </a:r>
           </a:p>
           <a:p>
             <a:r>
               <a:rPr lang="en-US" dirty="0"/>
-              <a:t>Then explain to them what you were going for, so </a:t>
-            </a:r>
-            <a:r>
-              <a:rPr lang="en-US"/>
-              <a:t>the answer</a:t>
-            </a:r>
+              <a:t>All objects/classes create new TYPES</a:t>
+            </a:r>
+          </a:p>
+          <a:p>
+            <a:r>
+              <a:rPr lang="en-US" dirty="0"/>
+              <a:t>Building blocks of programs</a:t>
+            </a:r>
+          </a:p>
+          <a:p>
+            <a:r>
+              <a:rPr lang="en-US" dirty="0"/>
+              <a:t>What can be stored in them?</a:t>
+            </a:r>
+          </a:p>
+          <a:p>
+            <a:r>
+              <a:rPr lang="en-US" dirty="0"/>
+              <a:t>How do you access what is stored?</a:t>
+            </a:r>
+          </a:p>
+          <a:p>
+            <a:pPr marL="230292" indent="0">
+              <a:buNone/>
+            </a:pPr>
             <a:endParaRPr lang="en-US" dirty="0"/>
           </a:p>
         </p:txBody>
@@ -23964,7 +24098,7 @@
     </p:spTree>
     <p:extLst>
       <p:ext uri="{BB962C8B-B14F-4D97-AF65-F5344CB8AC3E}">
-        <p14:creationId xmlns:p14="http://schemas.microsoft.com/office/powerpoint/2010/main" val="1441112270"/>
+        <p14:creationId xmlns:p14="http://schemas.microsoft.com/office/powerpoint/2010/main" val="1253004524"/>
       </p:ext>
     </p:extLst>
   </p:cSld>
@@ -24900,12 +25034,6 @@
 </file>
 
 <file path=customXml/item1.xml><?xml version="1.0" encoding="utf-8"?>
-<p:properties xmlns:p="http://schemas.microsoft.com/office/2006/metadata/properties" xmlns:xsi="http://www.w3.org/2001/XMLSchema-instance" xmlns:pc="http://schemas.microsoft.com/office/infopath/2007/PartnerControls">
-  <documentManagement/>
-</p:properties>
-</file>
-
-<file path=customXml/item2.xml><?xml version="1.0" encoding="utf-8"?>
 <ct:contentTypeSchema xmlns:ct="http://schemas.microsoft.com/office/2006/metadata/contentType" xmlns:ma="http://schemas.microsoft.com/office/2006/metadata/properties/metaAttributes" ct:_="" ma:_="" ma:contentTypeName="Document" ma:contentTypeID="0x010100074387D78AC76C4289401EF66FB51FCC" ma:contentTypeVersion="14" ma:contentTypeDescription="Create a new document." ma:contentTypeScope="" ma:versionID="16aa88660fc2fdca5573e381835fe0c9">
   <xsd:schema xmlns:xsd="http://www.w3.org/2001/XMLSchema" xmlns:xs="http://www.w3.org/2001/XMLSchema" xmlns:p="http://schemas.microsoft.com/office/2006/metadata/properties" xmlns:ns3="92c41bee-f0ee-4aa6-9399-a35fbb883510" xmlns:ns4="e06ed288-fd75-4b50-bbed-f5a5df88c31c" targetNamespace="http://schemas.microsoft.com/office/2006/metadata/properties" ma:root="true" ma:fieldsID="d08ce21c39dd96af8dcee1a6fd74aaf6" ns3:_="" ns4:_="">
     <xsd:import namespace="92c41bee-f0ee-4aa6-9399-a35fbb883510"/>
@@ -25134,6 +25262,12 @@
 </ct:contentTypeSchema>
 </file>
 
+<file path=customXml/item2.xml><?xml version="1.0" encoding="utf-8"?>
+<p:properties xmlns:p="http://schemas.microsoft.com/office/2006/metadata/properties" xmlns:xsi="http://www.w3.org/2001/XMLSchema-instance" xmlns:pc="http://schemas.microsoft.com/office/infopath/2007/PartnerControls">
+  <documentManagement/>
+</p:properties>
+</file>
+
 <file path=customXml/item3.xml><?xml version="1.0" encoding="utf-8"?>
 <?mso-contentType ?>
 <FormTemplates xmlns="http://schemas.microsoft.com/sharepoint/v3/contenttype/forms">
@@ -25144,23 +25278,6 @@
 </file>
 
 <file path=customXml/itemProps1.xml><?xml version="1.0" encoding="utf-8"?>
-<ds:datastoreItem xmlns:ds="http://schemas.openxmlformats.org/officeDocument/2006/customXml" ds:itemID="{E7B4BED8-6587-430C-8C6E-C226A7D33E25}">
-  <ds:schemaRefs>
-    <ds:schemaRef ds:uri="http://purl.org/dc/dcmitype/"/>
-    <ds:schemaRef ds:uri="http://schemas.microsoft.com/office/2006/documentManagement/types"/>
-    <ds:schemaRef ds:uri="http://purl.org/dc/elements/1.1/"/>
-    <ds:schemaRef ds:uri="e06ed288-fd75-4b50-bbed-f5a5df88c31c"/>
-    <ds:schemaRef ds:uri="http://schemas.microsoft.com/office/infopath/2007/PartnerControls"/>
-    <ds:schemaRef ds:uri="http://schemas.microsoft.com/office/2006/metadata/properties"/>
-    <ds:schemaRef ds:uri="92c41bee-f0ee-4aa6-9399-a35fbb883510"/>
-    <ds:schemaRef ds:uri="http://schemas.openxmlformats.org/package/2006/metadata/core-properties"/>
-    <ds:schemaRef ds:uri="http://www.w3.org/XML/1998/namespace"/>
-    <ds:schemaRef ds:uri="http://purl.org/dc/terms/"/>
-  </ds:schemaRefs>
-</ds:datastoreItem>
-</file>
-
-<file path=customXml/itemProps2.xml><?xml version="1.0" encoding="utf-8"?>
 <ds:datastoreItem xmlns:ds="http://schemas.openxmlformats.org/officeDocument/2006/customXml" ds:itemID="{B0282DB5-35EB-48D1-A750-D08F08F70F7C}">
   <ds:schemaRefs>
     <ds:schemaRef ds:uri="http://schemas.microsoft.com/office/2006/metadata/contentType"/>
@@ -25179,6 +25296,23 @@
 </ds:datastoreItem>
 </file>
 
+<file path=customXml/itemProps2.xml><?xml version="1.0" encoding="utf-8"?>
+<ds:datastoreItem xmlns:ds="http://schemas.openxmlformats.org/officeDocument/2006/customXml" ds:itemID="{E7B4BED8-6587-430C-8C6E-C226A7D33E25}">
+  <ds:schemaRefs>
+    <ds:schemaRef ds:uri="http://purl.org/dc/dcmitype/"/>
+    <ds:schemaRef ds:uri="http://schemas.microsoft.com/office/2006/documentManagement/types"/>
+    <ds:schemaRef ds:uri="http://purl.org/dc/elements/1.1/"/>
+    <ds:schemaRef ds:uri="e06ed288-fd75-4b50-bbed-f5a5df88c31c"/>
+    <ds:schemaRef ds:uri="http://schemas.microsoft.com/office/infopath/2007/PartnerControls"/>
+    <ds:schemaRef ds:uri="http://schemas.microsoft.com/office/2006/metadata/properties"/>
+    <ds:schemaRef ds:uri="92c41bee-f0ee-4aa6-9399-a35fbb883510"/>
+    <ds:schemaRef ds:uri="http://schemas.openxmlformats.org/package/2006/metadata/core-properties"/>
+    <ds:schemaRef ds:uri="http://www.w3.org/XML/1998/namespace"/>
+    <ds:schemaRef ds:uri="http://purl.org/dc/terms/"/>
+  </ds:schemaRefs>
+</ds:datastoreItem>
+</file>
+
 <file path=customXml/itemProps3.xml><?xml version="1.0" encoding="utf-8"?>
 <ds:datastoreItem xmlns:ds="http://schemas.openxmlformats.org/officeDocument/2006/customXml" ds:itemID="{859D3A98-3522-4EE5-94F5-88815D34F733}">
   <ds:schemaRefs>

</xml_diff>